<commit_message>
added azure configure for terraform to slide and online content
</commit_message>
<xml_diff>
--- a/slides/1-Setting Up the Environment.pptx
+++ b/slides/1-Setting Up the Environment.pptx
@@ -5,7 +5,7 @@
     <p:sldMasterId id="2147483708" r:id="rId1"/>
   </p:sldMasterIdLst>
   <p:notesMasterIdLst>
-    <p:notesMasterId r:id="rId11"/>
+    <p:notesMasterId r:id="rId12"/>
   </p:notesMasterIdLst>
   <p:sldIdLst>
     <p:sldId id="256" r:id="rId2"/>
@@ -15,8 +15,9 @@
     <p:sldId id="262" r:id="rId6"/>
     <p:sldId id="258" r:id="rId7"/>
     <p:sldId id="259" r:id="rId8"/>
-    <p:sldId id="260" r:id="rId9"/>
-    <p:sldId id="266" r:id="rId10"/>
+    <p:sldId id="267" r:id="rId9"/>
+    <p:sldId id="260" r:id="rId10"/>
+    <p:sldId id="266" r:id="rId11"/>
   </p:sldIdLst>
   <p:sldSz cx="12192000" cy="6858000"/>
   <p:notesSz cx="6858000" cy="9144000"/>
@@ -5980,8 +5981,6 @@
     <dgm:cxn modelId="{D6C16D3B-5DCF-534E-99E0-DC7F9DADA13C}" type="presOf" srcId="{6E72CEE2-0477-44D0-9E22-5CE6B0B69C12}" destId="{B90C3CB1-9858-F845-820A-DA5725D786C9}" srcOrd="0" destOrd="0" presId="urn:microsoft.com/office/officeart/2016/7/layout/VerticalSolidActionList"/>
     <dgm:cxn modelId="{DEEFC844-2F43-4903-8375-6D24B900BB7B}" srcId="{5A594A40-BE74-4477-9853-5F0104170F80}" destId="{156D531B-1B10-4846-B4D3-5EFD6A909D02}" srcOrd="1" destOrd="0" parTransId="{17B138EC-D880-4A82-98B8-97993C186B29}" sibTransId="{73054F19-8ECB-4C20-B000-461139586214}"/>
     <dgm:cxn modelId="{52C42345-57EB-4352-A7E7-CEC9835083DD}" srcId="{57FD3534-C67D-4708-B5EA-A2CA947DD8F7}" destId="{E9ED9BBE-A0CA-4138-8DF6-910B7AFB654A}" srcOrd="3" destOrd="0" parTransId="{557C59E1-62C7-4C92-983D-830B4AB0D8F9}" sibTransId="{071454A0-BFC2-4B4B-B5D0-F9A1B749F98F}"/>
-    <dgm:cxn modelId="{FC84B551-3686-4172-AF53-35FBFE323990}" srcId="{9BB56C3B-D9E1-4391-9732-F74076A91D01}" destId="{33319D89-FCF8-41DD-B30C-A1DA5CDF6081}" srcOrd="0" destOrd="0" parTransId="{89B1F18B-BD01-4A1C-9750-251BDF8B3B29}" sibTransId="{587AAA7F-AADC-4D02-BAED-8D5E35B4F03B}"/>
-    <dgm:cxn modelId="{5DAEDC59-670D-544B-A704-F9BB0D78E305}" type="presOf" srcId="{B3DEEC1B-43A9-4BBD-8C38-119D00890313}" destId="{B259AA3C-5557-3841-A1AE-6D4084E26F04}" srcOrd="0" destOrd="1" presId="urn:microsoft.com/office/officeart/2016/7/layout/VerticalSolidActionList"/>
     <dgm:cxn modelId="{3D48B865-D51E-824D-BD2C-9F738D2C40F6}" type="presOf" srcId="{33319D89-FCF8-41DD-B30C-A1DA5CDF6081}" destId="{92EAB457-E39A-334F-96ED-E44D0970D25C}" srcOrd="0" destOrd="0" presId="urn:microsoft.com/office/officeart/2016/7/layout/VerticalSolidActionList"/>
     <dgm:cxn modelId="{E9EAC767-83CA-43C8-8654-1C1B9F26A8E8}" srcId="{E26C6458-52E6-476C-AE48-D89BF629D86A}" destId="{AC27E3DC-3C3A-475F-B9BB-486A4D808E03}" srcOrd="3" destOrd="0" parTransId="{A41C6676-724E-4C3E-BC82-AFB54F773559}" sibTransId="{B1864D4F-22FB-467C-A320-9D66420085E9}"/>
     <dgm:cxn modelId="{092CED67-899B-4E0B-84B3-88D7D9CAEF9C}" srcId="{E26C6458-52E6-476C-AE48-D89BF629D86A}" destId="{1BAEAB79-757F-4FC0-AEF7-038BB418BC56}" srcOrd="2" destOrd="0" parTransId="{742A2883-5958-465D-BA11-69FE4C3C2646}" sibTransId="{94440AC8-0188-4241-BF0D-BB05449C7488}"/>
@@ -5989,7 +5988,9 @@
     <dgm:cxn modelId="{938D8D6B-2DF8-443D-A5DD-F91E79DD0C53}" srcId="{6E72CEE2-0477-44D0-9E22-5CE6B0B69C12}" destId="{E26C6458-52E6-476C-AE48-D89BF629D86A}" srcOrd="0" destOrd="0" parTransId="{BA9B7774-B1D0-430D-B36F-39142FBB2455}" sibTransId="{A7BB7EA3-B520-441A-8B49-AAB282E524BB}"/>
     <dgm:cxn modelId="{C789926F-72BF-4226-A66B-590DCDE4E4CC}" srcId="{9BB56C3B-D9E1-4391-9732-F74076A91D01}" destId="{DE4A7A26-D524-4EF2-A7B1-D4C5634F7797}" srcOrd="2" destOrd="0" parTransId="{38877B48-DBA7-4644-9636-E5DC1F1C2FFC}" sibTransId="{5A3971CD-40CE-4B25-8257-2A18E0EC7D3D}"/>
     <dgm:cxn modelId="{D5F06271-DE3A-47FF-B518-ED8B38653269}" srcId="{5A594A40-BE74-4477-9853-5F0104170F80}" destId="{8CC0719D-2A8B-4732-8F6C-1FB0BDB00D9F}" srcOrd="0" destOrd="0" parTransId="{E4612BC3-3078-49CC-8F21-DFEFBE90753F}" sibTransId="{FA00144A-FC21-43D5-B160-5686042C1CE1}"/>
+    <dgm:cxn modelId="{FC84B551-3686-4172-AF53-35FBFE323990}" srcId="{9BB56C3B-D9E1-4391-9732-F74076A91D01}" destId="{33319D89-FCF8-41DD-B30C-A1DA5CDF6081}" srcOrd="0" destOrd="0" parTransId="{89B1F18B-BD01-4A1C-9750-251BDF8B3B29}" sibTransId="{587AAA7F-AADC-4D02-BAED-8D5E35B4F03B}"/>
     <dgm:cxn modelId="{116BFA74-4EB3-6540-A99D-3241CB8DFEA5}" type="presOf" srcId="{57FD3534-C67D-4708-B5EA-A2CA947DD8F7}" destId="{6944DFDC-7583-A54F-8EBA-008FF11CE9C0}" srcOrd="0" destOrd="0" presId="urn:microsoft.com/office/officeart/2016/7/layout/VerticalSolidActionList"/>
+    <dgm:cxn modelId="{5DAEDC59-670D-544B-A704-F9BB0D78E305}" type="presOf" srcId="{B3DEEC1B-43A9-4BBD-8C38-119D00890313}" destId="{B259AA3C-5557-3841-A1AE-6D4084E26F04}" srcOrd="0" destOrd="1" presId="urn:microsoft.com/office/officeart/2016/7/layout/VerticalSolidActionList"/>
     <dgm:cxn modelId="{02A46F7B-F1F0-45FD-B0DA-A8BF5B6D59B2}" srcId="{E26C6458-52E6-476C-AE48-D89BF629D86A}" destId="{9ADA9F2A-C066-48F9-938A-5BF5759F0071}" srcOrd="0" destOrd="0" parTransId="{F98EF460-3985-489C-8227-85AFE0DE8F67}" sibTransId="{B043C0F5-E637-466C-8242-923795625A1E}"/>
     <dgm:cxn modelId="{BDB06691-06E3-4AE3-A2C0-3AD5C369CB9C}" srcId="{DE4A7A26-D524-4EF2-A7B1-D4C5634F7797}" destId="{57FD3534-C67D-4708-B5EA-A2CA947DD8F7}" srcOrd="0" destOrd="0" parTransId="{115334EE-3E22-4D1E-8502-726D51DFEE3A}" sibTransId="{C99157BF-37F8-4EC1-976E-CB7295F13B74}"/>
     <dgm:cxn modelId="{A31AB493-259E-CA49-930A-9983F445ECD4}" type="presOf" srcId="{68F9707A-979B-4E83-8E3E-9927A0301DCD}" destId="{6944DFDC-7583-A54F-8EBA-008FF11CE9C0}" srcOrd="0" destOrd="5" presId="urn:microsoft.com/office/officeart/2016/7/layout/VerticalSolidActionList"/>
@@ -6499,10 +6500,10 @@
     <dgm:cxn modelId="{83132300-3D67-CB43-B54C-91B04D26BEE3}" type="presOf" srcId="{067F6451-6544-AD4B-AA81-3CCBAD49CB44}" destId="{7BB41575-4599-3348-A956-55708EEA68D0}" srcOrd="0" destOrd="1" presId="urn:microsoft.com/office/officeart/2016/7/layout/VerticalSolidActionList"/>
     <dgm:cxn modelId="{A15D490B-D5D7-A74C-BA2A-DECD916FD7E0}" type="presOf" srcId="{2107550E-5D86-4FD1-A2BF-D8266138BF95}" destId="{FCAA40CF-F01F-F747-849A-34D006DF4B2F}" srcOrd="0" destOrd="0" presId="urn:microsoft.com/office/officeart/2016/7/layout/VerticalSolidActionList"/>
     <dgm:cxn modelId="{7D9C6B16-72C2-4DEA-B5E6-C9BD2E042141}" srcId="{2107550E-5D86-4FD1-A2BF-D8266138BF95}" destId="{5DC45F96-32C3-4125-B376-90F17E0DC5BA}" srcOrd="0" destOrd="0" parTransId="{25A505A4-D86F-4AE6-8371-4E1C38B84CCF}" sibTransId="{30EF9A0B-8089-4E45-8CBF-0DFE7E4CAC90}"/>
-    <dgm:cxn modelId="{31028349-E631-8541-922E-C277D75731E1}" type="presOf" srcId="{B271C7B3-8802-431E-9301-DF9097D27894}" destId="{165785A2-7E3C-BB43-9519-A90D6DB9E045}" srcOrd="0" destOrd="1" presId="urn:microsoft.com/office/officeart/2016/7/layout/VerticalSolidActionList"/>
     <dgm:cxn modelId="{C8782E5D-C39A-3A48-A610-F0A48DE4695B}" srcId="{7A85D807-2869-44D8-B696-7A9F88A0A222}" destId="{E16BE1D5-A7E3-EE4F-984F-87F6B7773D83}" srcOrd="1" destOrd="0" parTransId="{AC59C6F3-032A-A845-A0D5-C25964393213}" sibTransId="{B5AAA734-7638-2345-9176-EAA1D224018E}"/>
     <dgm:cxn modelId="{C69E385E-507F-4F48-9579-752918F9D55A}" type="presOf" srcId="{BA25CCA2-3497-466E-9DB1-257523422369}" destId="{165785A2-7E3C-BB43-9519-A90D6DB9E045}" srcOrd="0" destOrd="2" presId="urn:microsoft.com/office/officeart/2016/7/layout/VerticalSolidActionList"/>
     <dgm:cxn modelId="{043FD265-11DC-4431-913E-16F27D3384F5}" srcId="{7A85D807-2869-44D8-B696-7A9F88A0A222}" destId="{59A98CE1-8BE6-4AA2-8B1F-5AEEEBE643B8}" srcOrd="0" destOrd="0" parTransId="{2B618CFF-5437-4999-8527-607CCA117233}" sibTransId="{C2E7D98E-BD4D-4E6B-8942-B176C96901C4}"/>
+    <dgm:cxn modelId="{31028349-E631-8541-922E-C277D75731E1}" type="presOf" srcId="{B271C7B3-8802-431E-9301-DF9097D27894}" destId="{165785A2-7E3C-BB43-9519-A90D6DB9E045}" srcOrd="0" destOrd="1" presId="urn:microsoft.com/office/officeart/2016/7/layout/VerticalSolidActionList"/>
     <dgm:cxn modelId="{3C989A78-5368-064A-8B22-E24CAAFBCFCF}" type="presOf" srcId="{E94B6DD7-B843-4564-AAF9-469DA677D204}" destId="{BE10371F-26AB-2C41-B704-33AF30C6B9A2}" srcOrd="0" destOrd="0" presId="urn:microsoft.com/office/officeart/2016/7/layout/VerticalSolidActionList"/>
     <dgm:cxn modelId="{AE0B227F-1ABA-4B47-89DB-37F4692BA6B7}" srcId="{E94B6DD7-B843-4564-AAF9-469DA677D204}" destId="{3C1739F6-6233-4692-A729-1C9461CB86CD}" srcOrd="2" destOrd="0" parTransId="{00F0F21D-C59E-4550-92DF-409BD969B8F5}" sibTransId="{F99CA02F-46ED-4C70-9997-F4DDD94E0189}"/>
     <dgm:cxn modelId="{0219018C-EEC4-478C-9B3A-25D950BBB081}" srcId="{E94B6DD7-B843-4564-AAF9-469DA677D204}" destId="{2107550E-5D86-4FD1-A2BF-D8266138BF95}" srcOrd="0" destOrd="0" parTransId="{C0E0B970-2EDC-49E8-984C-94DF66449C95}" sibTransId="{EE47B323-D240-4BCE-B31A-B270DBD51A2C}"/>
@@ -7183,14 +7184,14 @@
     <dgm:cxn modelId="{210A9A0A-B9FE-7C47-9121-643BD6C3ED9F}" type="presOf" srcId="{EB6BA4DC-6123-4DE7-8A35-6D94288D2720}" destId="{7EC0ED8C-5904-6C4E-A926-8C021762E236}" srcOrd="0" destOrd="1" presId="urn:microsoft.com/office/officeart/2016/7/layout/VerticalSolidActionList"/>
     <dgm:cxn modelId="{27702428-0D74-41A3-B116-7CB42752314D}" srcId="{23289555-3535-4F4B-94FD-713700C63D60}" destId="{71AFEFC2-5D1F-431C-9604-A4694D9C3A34}" srcOrd="0" destOrd="0" parTransId="{5DE7B29A-040A-4A0F-B4B2-60CD37227866}" sibTransId="{43DC652B-8D9A-4A3F-BC81-2A8B65C516D0}"/>
     <dgm:cxn modelId="{D902DE34-7321-45A5-84B6-E098CC692BEF}" srcId="{23289555-3535-4F4B-94FD-713700C63D60}" destId="{B85DD76C-6C00-413D-A8B2-0EF5CED13D3D}" srcOrd="1" destOrd="0" parTransId="{B2BA0E16-ECDF-4673-BD1E-D55CAE556C65}" sibTransId="{B21C62E4-49E7-46F3-A4AF-1686A2EA012F}"/>
-    <dgm:cxn modelId="{56C7A04A-9960-4E15-8763-894C34FA5C75}" srcId="{B85DD76C-6C00-413D-A8B2-0EF5CED13D3D}" destId="{EEE1D3DC-63F1-493A-8E63-1F509BB46275}" srcOrd="0" destOrd="0" parTransId="{19ACF387-9059-4F5B-8119-77058A3BF5AA}" sibTransId="{A77B1CC5-5968-4324-9BFB-37DA30E38E5E}"/>
-    <dgm:cxn modelId="{E972E359-4F43-1544-923C-E72F76ED3372}" type="presOf" srcId="{79BBC15A-35C4-4A5E-80F2-9FEB1C24334B}" destId="{002EBC43-F29B-E848-B2F6-F41E15978E1C}" srcOrd="0" destOrd="0" presId="urn:microsoft.com/office/officeart/2016/7/layout/VerticalSolidActionList"/>
     <dgm:cxn modelId="{3E2B2D61-4973-47EC-AB42-7C814D987303}" srcId="{79BBC15A-35C4-4A5E-80F2-9FEB1C24334B}" destId="{4FEA8D75-0144-492B-9E25-ED33A3E169BD}" srcOrd="2" destOrd="0" parTransId="{6059212C-682D-46D8-BDF2-6CD21093C7ED}" sibTransId="{85C1526D-ACEC-4E36-A95E-C188AFFE51C8}"/>
     <dgm:cxn modelId="{D6A94E66-F16E-4957-885B-71B2FB0285F2}" srcId="{79BBC15A-35C4-4A5E-80F2-9FEB1C24334B}" destId="{BC09A616-366C-4A88-8E73-7A7F4BF1CC59}" srcOrd="0" destOrd="0" parTransId="{4C3A67A0-64A0-4E7D-9234-8E0DEE6A0CC7}" sibTransId="{5B44DDF7-BF6F-4737-AEEA-F2C808A4BA47}"/>
     <dgm:cxn modelId="{3045CF67-1E58-DD4A-8C45-BAAC7A1EB53F}" type="presOf" srcId="{1160A655-40A0-F845-AFF2-4604FA5198F2}" destId="{650827AD-5C1B-B040-9193-AEF8DE7EDDA0}" srcOrd="0" destOrd="1" presId="urn:microsoft.com/office/officeart/2016/7/layout/VerticalSolidActionList"/>
+    <dgm:cxn modelId="{56C7A04A-9960-4E15-8763-894C34FA5C75}" srcId="{B85DD76C-6C00-413D-A8B2-0EF5CED13D3D}" destId="{EEE1D3DC-63F1-493A-8E63-1F509BB46275}" srcOrd="0" destOrd="0" parTransId="{19ACF387-9059-4F5B-8119-77058A3BF5AA}" sibTransId="{A77B1CC5-5968-4324-9BFB-37DA30E38E5E}"/>
     <dgm:cxn modelId="{395EBF6D-7955-7942-B5F9-2E4EA0794FC2}" type="presOf" srcId="{EEE1D3DC-63F1-493A-8E63-1F509BB46275}" destId="{A02BAD33-14E7-2046-9CC0-93A4A6558C9B}" srcOrd="0" destOrd="0" presId="urn:microsoft.com/office/officeart/2016/7/layout/VerticalSolidActionList"/>
     <dgm:cxn modelId="{F0B27778-2CAD-463D-BAD6-4027B76CDA0D}" srcId="{23289555-3535-4F4B-94FD-713700C63D60}" destId="{79BBC15A-35C4-4A5E-80F2-9FEB1C24334B}" srcOrd="2" destOrd="0" parTransId="{A045FBC6-5502-49A0-BB71-7CF428F74BB7}" sibTransId="{5504E70F-0CD9-4E6E-B6A4-D51AB6C0E47B}"/>
     <dgm:cxn modelId="{2A2C4879-BF20-2B43-9152-1C6C41AF3DE5}" type="presOf" srcId="{B85DD76C-6C00-413D-A8B2-0EF5CED13D3D}" destId="{4692BFF0-0567-B742-9928-FD98E94D1A5F}" srcOrd="0" destOrd="0" presId="urn:microsoft.com/office/officeart/2016/7/layout/VerticalSolidActionList"/>
+    <dgm:cxn modelId="{E972E359-4F43-1544-923C-E72F76ED3372}" type="presOf" srcId="{79BBC15A-35C4-4A5E-80F2-9FEB1C24334B}" destId="{002EBC43-F29B-E848-B2F6-F41E15978E1C}" srcOrd="0" destOrd="0" presId="urn:microsoft.com/office/officeart/2016/7/layout/VerticalSolidActionList"/>
     <dgm:cxn modelId="{3BB1297C-6351-454E-98AB-36B0422F21E8}" type="presOf" srcId="{45D76F1E-511E-4818-B98D-32A536427DC5}" destId="{A02BAD33-14E7-2046-9CC0-93A4A6558C9B}" srcOrd="0" destOrd="1" presId="urn:microsoft.com/office/officeart/2016/7/layout/VerticalSolidActionList"/>
     <dgm:cxn modelId="{6B488F82-A9D9-9A48-A9C8-4BE863CCE606}" type="presOf" srcId="{BC09A616-366C-4A88-8E73-7A7F4BF1CC59}" destId="{650827AD-5C1B-B040-9193-AEF8DE7EDDA0}" srcOrd="0" destOrd="0" presId="urn:microsoft.com/office/officeart/2016/7/layout/VerticalSolidActionList"/>
     <dgm:cxn modelId="{537A7987-2868-41FA-A4F4-F99FDD48FFA8}" srcId="{71AFEFC2-5D1F-431C-9604-A4694D9C3A34}" destId="{704A03BB-1EC8-439E-9FF2-00A46255708F}" srcOrd="0" destOrd="0" parTransId="{0A569658-78F3-49AE-BE55-A744DBF685F6}" sibTransId="{00F8FC8B-5D63-41F0-B370-7014D7B606F7}"/>
@@ -7982,18 +7983,18 @@
     <dgm:cxn modelId="{A4302D29-F0D0-7A4A-836F-C3EA8C5CEEF4}" type="presOf" srcId="{9366F6A8-E4AC-469C-BD3F-9C3004058FDD}" destId="{B5AFB090-1F36-CA45-938D-C6D8CFA4AD0C}" srcOrd="0" destOrd="0" presId="urn:microsoft.com/office/officeart/2016/7/layout/VerticalDownArrowProcess"/>
     <dgm:cxn modelId="{6DA2CD37-2800-4FD1-B6FE-3AE45A28F304}" srcId="{818F219C-7CD7-4CF6-8F58-5833DF30B296}" destId="{8F61A3D2-416D-4661-B87A-5D4AAEB31720}" srcOrd="0" destOrd="0" parTransId="{04D5D9C3-A914-4D65-B5B4-9355D25EEC2B}" sibTransId="{4CF8DC96-3B21-4BE1-9087-921B3ED28035}"/>
     <dgm:cxn modelId="{4652713E-E6E6-4FB3-ACC7-6E2CCD33093B}" srcId="{9366F6A8-E4AC-469C-BD3F-9C3004058FDD}" destId="{20C2E4A7-A0E5-48A4-A2A3-3B8437528D12}" srcOrd="2" destOrd="0" parTransId="{B0997933-008C-4278-8DCE-DA63880A39A4}" sibTransId="{B96C51AD-8D5C-443C-B2CE-CE3A0AEEF4F8}"/>
-    <dgm:cxn modelId="{18E15947-A8CF-3846-9E9B-4C0AA404E0B8}" type="presOf" srcId="{8DAC5310-B6A9-4114-BB68-A5F2D95557B8}" destId="{56139284-D975-7740-9B9E-E3BB130FAF37}" srcOrd="0" destOrd="1" presId="urn:microsoft.com/office/officeart/2016/7/layout/VerticalDownArrowProcess"/>
-    <dgm:cxn modelId="{7FEB2A4B-83DD-4D70-9F48-5EC27C6BC352}" srcId="{596B0AE2-9304-421A-AE82-3DAADCBBDFFC}" destId="{F70A43B2-2D70-4FAE-9A09-8DB39E721442}" srcOrd="2" destOrd="0" parTransId="{2D1CAB00-288D-46D5-BEDB-12DB497C8B93}" sibTransId="{006DFBF0-5F59-4EF7-BE09-DC44329B0430}"/>
-    <dgm:cxn modelId="{68DA9254-FFAD-504B-89A3-20F37DA192F4}" type="presOf" srcId="{4EDB3F90-4A64-4025-8E20-37C30E0DAB52}" destId="{10DCE3CC-C6A3-9A48-9D01-9978C87F4158}" srcOrd="0" destOrd="1" presId="urn:microsoft.com/office/officeart/2016/7/layout/VerticalDownArrowProcess"/>
-    <dgm:cxn modelId="{13BC7B57-3B07-DD4F-9569-D120B5C6961F}" type="presOf" srcId="{20C2E4A7-A0E5-48A4-A2A3-3B8437528D12}" destId="{57E73B7C-37D7-2E4C-9A12-C1E202590101}" srcOrd="0" destOrd="2" presId="urn:microsoft.com/office/officeart/2016/7/layout/VerticalDownArrowProcess"/>
-    <dgm:cxn modelId="{0D668859-9EA4-4ABD-844D-BC04914C51AB}" srcId="{486D2264-62EE-4B6F-8B8F-B68129E0DF9C}" destId="{596B0AE2-9304-421A-AE82-3DAADCBBDFFC}" srcOrd="2" destOrd="0" parTransId="{4FBD7C88-3F09-4905-A532-DE9A00D2F06A}" sibTransId="{30085F6F-D126-449E-AE10-1E5DCFAA6074}"/>
     <dgm:cxn modelId="{FD210562-A5E9-9F4A-AE4B-2BA772800B2A}" type="presOf" srcId="{596B0AE2-9304-421A-AE82-3DAADCBBDFFC}" destId="{4B51B68D-DCE5-C44E-9606-F21363BB3703}" srcOrd="1" destOrd="0" presId="urn:microsoft.com/office/officeart/2016/7/layout/VerticalDownArrowProcess"/>
     <dgm:cxn modelId="{DEE47963-2D9E-4B85-86E7-DC7486200E2D}" srcId="{A6C8E8ED-7A43-4F61-B125-C160FC9096D1}" destId="{5F250E43-0321-44E9-AC28-1B9B0D6724D0}" srcOrd="0" destOrd="0" parTransId="{B96E5D8A-091E-4CC7-B6D7-E72DC183DBFD}" sibTransId="{F79FF53F-8F87-4C8A-A094-9ADBA663D212}"/>
     <dgm:cxn modelId="{7E88DE65-110F-4B88-8A91-E2277AEC6963}" srcId="{486D2264-62EE-4B6F-8B8F-B68129E0DF9C}" destId="{A6C8E8ED-7A43-4F61-B125-C160FC9096D1}" srcOrd="1" destOrd="0" parTransId="{FD1E7A88-4DA2-42AC-8ADA-2F79799C765B}" sibTransId="{1FEF28A8-5F60-4551-9941-92D759E78543}"/>
     <dgm:cxn modelId="{C27C4967-8505-924B-9315-635EB24C44DB}" type="presOf" srcId="{E3B41278-9C96-40E0-87C4-CEC5C8A47162}" destId="{9F20CE5A-CDE1-B24C-A25F-9766FCBF7E86}" srcOrd="0" destOrd="1" presId="urn:microsoft.com/office/officeart/2016/7/layout/VerticalDownArrowProcess"/>
+    <dgm:cxn modelId="{18E15947-A8CF-3846-9E9B-4C0AA404E0B8}" type="presOf" srcId="{8DAC5310-B6A9-4114-BB68-A5F2D95557B8}" destId="{56139284-D975-7740-9B9E-E3BB130FAF37}" srcOrd="0" destOrd="1" presId="urn:microsoft.com/office/officeart/2016/7/layout/VerticalDownArrowProcess"/>
+    <dgm:cxn modelId="{7FEB2A4B-83DD-4D70-9F48-5EC27C6BC352}" srcId="{596B0AE2-9304-421A-AE82-3DAADCBBDFFC}" destId="{F70A43B2-2D70-4FAE-9A09-8DB39E721442}" srcOrd="2" destOrd="0" parTransId="{2D1CAB00-288D-46D5-BEDB-12DB497C8B93}" sibTransId="{006DFBF0-5F59-4EF7-BE09-DC44329B0430}"/>
     <dgm:cxn modelId="{A97F8670-F5E8-6F43-A63E-6F3C3DEE556D}" type="presOf" srcId="{A6C8E8ED-7A43-4F61-B125-C160FC9096D1}" destId="{F432E064-812D-AE40-88F0-6927F18E8908}" srcOrd="0" destOrd="0" presId="urn:microsoft.com/office/officeart/2016/7/layout/VerticalDownArrowProcess"/>
     <dgm:cxn modelId="{FE2DF570-A531-4688-8970-E62637E55280}" srcId="{9366F6A8-E4AC-469C-BD3F-9C3004058FDD}" destId="{5C22CA37-E60A-440F-B086-BBC8F335B0D3}" srcOrd="0" destOrd="0" parTransId="{D7D6D232-01E4-4B66-9C69-B884280F2E23}" sibTransId="{A101F57A-DC4B-4E2C-AAFF-0CBEDA47F5B1}"/>
     <dgm:cxn modelId="{5CAFEB72-BC09-9241-B618-CF164C0D8F09}" type="presOf" srcId="{1854B2E5-8442-4C8D-A868-FF72D8208451}" destId="{57E73B7C-37D7-2E4C-9A12-C1E202590101}" srcOrd="0" destOrd="1" presId="urn:microsoft.com/office/officeart/2016/7/layout/VerticalDownArrowProcess"/>
+    <dgm:cxn modelId="{68DA9254-FFAD-504B-89A3-20F37DA192F4}" type="presOf" srcId="{4EDB3F90-4A64-4025-8E20-37C30E0DAB52}" destId="{10DCE3CC-C6A3-9A48-9D01-9978C87F4158}" srcOrd="0" destOrd="1" presId="urn:microsoft.com/office/officeart/2016/7/layout/VerticalDownArrowProcess"/>
+    <dgm:cxn modelId="{13BC7B57-3B07-DD4F-9569-D120B5C6961F}" type="presOf" srcId="{20C2E4A7-A0E5-48A4-A2A3-3B8437528D12}" destId="{57E73B7C-37D7-2E4C-9A12-C1E202590101}" srcOrd="0" destOrd="2" presId="urn:microsoft.com/office/officeart/2016/7/layout/VerticalDownArrowProcess"/>
+    <dgm:cxn modelId="{0D668859-9EA4-4ABD-844D-BC04914C51AB}" srcId="{486D2264-62EE-4B6F-8B8F-B68129E0DF9C}" destId="{596B0AE2-9304-421A-AE82-3DAADCBBDFFC}" srcOrd="2" destOrd="0" parTransId="{4FBD7C88-3F09-4905-A532-DE9A00D2F06A}" sibTransId="{30085F6F-D126-449E-AE10-1E5DCFAA6074}"/>
     <dgm:cxn modelId="{1A10F47A-5EA8-7B43-A689-78E8CFF3FF06}" type="presOf" srcId="{5F250E43-0321-44E9-AC28-1B9B0D6724D0}" destId="{10DCE3CC-C6A3-9A48-9D01-9978C87F4158}" srcOrd="0" destOrd="0" presId="urn:microsoft.com/office/officeart/2016/7/layout/VerticalDownArrowProcess"/>
     <dgm:cxn modelId="{1B5CE27C-BA59-FC44-9718-5E775C448049}" type="presOf" srcId="{5C22CA37-E60A-440F-B086-BBC8F335B0D3}" destId="{57E73B7C-37D7-2E4C-9A12-C1E202590101}" srcOrd="0" destOrd="0" presId="urn:microsoft.com/office/officeart/2016/7/layout/VerticalDownArrowProcess"/>
     <dgm:cxn modelId="{5E6A6099-D238-6549-B8B1-FAD4386FACD5}" type="presOf" srcId="{818F219C-7CD7-4CF6-8F58-5833DF30B296}" destId="{CFDCFA59-C41F-2743-8060-BA4605C7D073}" srcOrd="0" destOrd="0" presId="urn:microsoft.com/office/officeart/2016/7/layout/VerticalDownArrowProcess"/>
@@ -9187,7 +9188,7 @@
           <a:schemeClr val="accent5">
             <a:tint val="40000"/>
             <a:alpha val="90000"/>
-            <a:hueOff val="2926865"/>
+            <a:hueOff val="2926864"/>
             <a:satOff val="9822"/>
             <a:lumOff val="1005"/>
             <a:alphaOff val="0"/>
@@ -9198,7 +9199,7 @@
             <a:schemeClr val="accent5">
               <a:tint val="40000"/>
               <a:alpha val="90000"/>
-              <a:hueOff val="2926865"/>
+              <a:hueOff val="2926864"/>
               <a:satOff val="9822"/>
               <a:lumOff val="1005"/>
               <a:alphaOff val="0"/>
@@ -9379,7 +9380,7 @@
           <a:schemeClr val="accent5">
             <a:tint val="40000"/>
             <a:alpha val="90000"/>
-            <a:hueOff val="5853731"/>
+            <a:hueOff val="5853729"/>
             <a:satOff val="19645"/>
             <a:lumOff val="2009"/>
             <a:alphaOff val="0"/>
@@ -9390,7 +9391,7 @@
             <a:schemeClr val="accent5">
               <a:tint val="40000"/>
               <a:alpha val="90000"/>
-              <a:hueOff val="5853731"/>
+              <a:hueOff val="5853729"/>
               <a:satOff val="19645"/>
               <a:lumOff val="2009"/>
               <a:alphaOff val="0"/>
@@ -9625,7 +9626,7 @@
           <a:schemeClr val="accent5">
             <a:tint val="40000"/>
             <a:alpha val="90000"/>
-            <a:hueOff val="8780596"/>
+            <a:hueOff val="8780593"/>
             <a:satOff val="29467"/>
             <a:lumOff val="3014"/>
             <a:alphaOff val="0"/>
@@ -9636,7 +9637,7 @@
             <a:schemeClr val="accent5">
               <a:tint val="40000"/>
               <a:alpha val="90000"/>
-              <a:hueOff val="8780596"/>
+              <a:hueOff val="8780593"/>
               <a:satOff val="29467"/>
               <a:lumOff val="3014"/>
               <a:alphaOff val="0"/>
@@ -10162,7 +10163,7 @@
         </a:prstGeom>
         <a:solidFill>
           <a:schemeClr val="accent2">
-            <a:hueOff val="-82826"/>
+            <a:hueOff val="-82827"/>
             <a:satOff val="-27168"/>
             <a:lumOff val="-9901"/>
             <a:alphaOff val="0"/>
@@ -10171,7 +10172,7 @@
         <a:ln w="34925" cap="flat" cmpd="sng" algn="in">
           <a:solidFill>
             <a:schemeClr val="accent2">
-              <a:hueOff val="-82826"/>
+              <a:hueOff val="-82827"/>
               <a:satOff val="-27168"/>
               <a:lumOff val="-9901"/>
               <a:alphaOff val="0"/>
@@ -10357,7 +10358,7 @@
         </a:prstGeom>
         <a:solidFill>
           <a:schemeClr val="accent2">
-            <a:hueOff val="-165653"/>
+            <a:hueOff val="-165654"/>
             <a:satOff val="-54335"/>
             <a:lumOff val="-19803"/>
             <a:alphaOff val="0"/>
@@ -10366,7 +10367,7 @@
         <a:ln w="34925" cap="flat" cmpd="sng" algn="in">
           <a:solidFill>
             <a:schemeClr val="accent2">
-              <a:hueOff val="-165653"/>
+              <a:hueOff val="-165654"/>
               <a:satOff val="-54335"/>
               <a:lumOff val="-19803"/>
               <a:alphaOff val="0"/>
@@ -10980,7 +10981,7 @@
         </a:prstGeom>
         <a:solidFill>
           <a:schemeClr val="accent2">
-            <a:hueOff val="-110435"/>
+            <a:hueOff val="-110436"/>
             <a:satOff val="-36223"/>
             <a:lumOff val="-13202"/>
             <a:alphaOff val="0"/>
@@ -10989,7 +10990,7 @@
         <a:ln w="34925" cap="flat" cmpd="sng" algn="in">
           <a:solidFill>
             <a:schemeClr val="accent2">
-              <a:hueOff val="-110435"/>
+              <a:hueOff val="-110436"/>
               <a:satOff val="-36223"/>
               <a:lumOff val="-13202"/>
               <a:alphaOff val="0"/>
@@ -11143,7 +11144,7 @@
         </a:prstGeom>
         <a:solidFill>
           <a:schemeClr val="accent2">
-            <a:hueOff val="-165653"/>
+            <a:hueOff val="-165654"/>
             <a:satOff val="-54335"/>
             <a:lumOff val="-19803"/>
             <a:alphaOff val="0"/>
@@ -11152,7 +11153,7 @@
         <a:ln w="34925" cap="flat" cmpd="sng" algn="in">
           <a:solidFill>
             <a:schemeClr val="accent2">
-              <a:hueOff val="-165653"/>
+              <a:hueOff val="-165654"/>
               <a:satOff val="-54335"/>
               <a:lumOff val="-19803"/>
               <a:alphaOff val="0"/>
@@ -13065,7 +13066,7 @@
         </a:prstGeom>
         <a:solidFill>
           <a:schemeClr val="accent2">
-            <a:hueOff val="-82826"/>
+            <a:hueOff val="-82827"/>
             <a:satOff val="-27168"/>
             <a:lumOff val="-9901"/>
             <a:alphaOff val="0"/>
@@ -13074,7 +13075,7 @@
         <a:ln w="34925" cap="flat" cmpd="sng" algn="in">
           <a:solidFill>
             <a:schemeClr val="accent2">
-              <a:hueOff val="-82826"/>
+              <a:hueOff val="-82827"/>
               <a:satOff val="-27168"/>
               <a:lumOff val="-9901"/>
               <a:alphaOff val="0"/>
@@ -13363,7 +13364,7 @@
         </a:prstGeom>
         <a:solidFill>
           <a:schemeClr val="accent2">
-            <a:hueOff val="-165653"/>
+            <a:hueOff val="-165654"/>
             <a:satOff val="-54335"/>
             <a:lumOff val="-19803"/>
             <a:alphaOff val="0"/>
@@ -13372,7 +13373,7 @@
         <a:ln w="34925" cap="flat" cmpd="sng" algn="in">
           <a:solidFill>
             <a:schemeClr val="accent2">
-              <a:hueOff val="-165653"/>
+              <a:hueOff val="-165654"/>
               <a:satOff val="-54335"/>
               <a:lumOff val="-19803"/>
               <a:alphaOff val="0"/>
@@ -21438,7 +21439,7 @@
           <a:p>
             <a:fld id="{5DC7FEA7-B2E8-E247-A911-16F0E02D9F01}" type="datetimeFigureOut">
               <a:rPr lang="en-US" smtClean="0"/>
-              <a:t>10/29/24</a:t>
+              <a:t>11/7/2024</a:t>
             </a:fld>
             <a:endParaRPr lang="en-US"/>
           </a:p>
@@ -21981,7 +21982,7 @@
           <a:p>
             <a:fld id="{A244D7B1-FEC8-414F-9653-CF4E963279F3}" type="datetimeFigureOut">
               <a:rPr lang="en-US" smtClean="0"/>
-              <a:t>10/29/24</a:t>
+              <a:t>11/7/2024</a:t>
             </a:fld>
             <a:endParaRPr lang="en-US"/>
           </a:p>
@@ -22311,7 +22312,7 @@
           <a:p>
             <a:fld id="{A244D7B1-FEC8-414F-9653-CF4E963279F3}" type="datetimeFigureOut">
               <a:rPr lang="en-US" smtClean="0"/>
-              <a:t>10/29/24</a:t>
+              <a:t>11/7/2024</a:t>
             </a:fld>
             <a:endParaRPr lang="en-US"/>
           </a:p>
@@ -22491,7 +22492,7 @@
           <a:p>
             <a:fld id="{A244D7B1-FEC8-414F-9653-CF4E963279F3}" type="datetimeFigureOut">
               <a:rPr lang="en-US" smtClean="0"/>
-              <a:t>10/29/24</a:t>
+              <a:t>11/7/2024</a:t>
             </a:fld>
             <a:endParaRPr lang="en-US"/>
           </a:p>
@@ -22661,7 +22662,7 @@
           <a:p>
             <a:fld id="{A244D7B1-FEC8-414F-9653-CF4E963279F3}" type="datetimeFigureOut">
               <a:rPr lang="en-US" smtClean="0"/>
-              <a:t>10/29/24</a:t>
+              <a:t>11/7/2024</a:t>
             </a:fld>
             <a:endParaRPr lang="en-US"/>
           </a:p>
@@ -22938,7 +22939,7 @@
           <a:p>
             <a:fld id="{A244D7B1-FEC8-414F-9653-CF4E963279F3}" type="datetimeFigureOut">
               <a:rPr lang="en-US" smtClean="0"/>
-              <a:t>10/29/24</a:t>
+              <a:t>11/7/2024</a:t>
             </a:fld>
             <a:endParaRPr lang="en-US"/>
           </a:p>
@@ -23332,7 +23333,7 @@
           <a:p>
             <a:fld id="{A244D7B1-FEC8-414F-9653-CF4E963279F3}" type="datetimeFigureOut">
               <a:rPr lang="en-US" smtClean="0"/>
-              <a:t>10/29/24</a:t>
+              <a:t>11/7/2024</a:t>
             </a:fld>
             <a:endParaRPr lang="en-US"/>
           </a:p>
@@ -23809,7 +23810,7 @@
           <a:p>
             <a:fld id="{A244D7B1-FEC8-414F-9653-CF4E963279F3}" type="datetimeFigureOut">
               <a:rPr lang="en-US" smtClean="0"/>
-              <a:t>10/29/24</a:t>
+              <a:t>11/7/2024</a:t>
             </a:fld>
             <a:endParaRPr lang="en-US"/>
           </a:p>
@@ -23927,7 +23928,7 @@
           <a:p>
             <a:fld id="{A244D7B1-FEC8-414F-9653-CF4E963279F3}" type="datetimeFigureOut">
               <a:rPr lang="en-US" smtClean="0"/>
-              <a:t>10/29/24</a:t>
+              <a:t>11/7/2024</a:t>
             </a:fld>
             <a:endParaRPr lang="en-US"/>
           </a:p>
@@ -24022,7 +24023,7 @@
           <a:p>
             <a:fld id="{A244D7B1-FEC8-414F-9653-CF4E963279F3}" type="datetimeFigureOut">
               <a:rPr lang="en-US" smtClean="0"/>
-              <a:t>10/29/24</a:t>
+              <a:t>11/7/2024</a:t>
             </a:fld>
             <a:endParaRPr lang="en-US"/>
           </a:p>
@@ -24368,7 +24369,7 @@
           <a:p>
             <a:fld id="{A244D7B1-FEC8-414F-9653-CF4E963279F3}" type="datetimeFigureOut">
               <a:rPr lang="en-US" smtClean="0"/>
-              <a:t>10/29/24</a:t>
+              <a:t>11/7/2024</a:t>
             </a:fld>
             <a:endParaRPr lang="en-US"/>
           </a:p>
@@ -24756,7 +24757,7 @@
           <a:p>
             <a:fld id="{A244D7B1-FEC8-414F-9653-CF4E963279F3}" type="datetimeFigureOut">
               <a:rPr lang="en-US" smtClean="0"/>
-              <a:t>10/29/24</a:t>
+              <a:t>11/7/2024</a:t>
             </a:fld>
             <a:endParaRPr lang="en-US"/>
           </a:p>
@@ -25034,7 +25035,7 @@
           <a:p>
             <a:fld id="{A244D7B1-FEC8-414F-9653-CF4E963279F3}" type="datetimeFigureOut">
               <a:rPr lang="en-US" smtClean="0"/>
-              <a:t>10/29/24</a:t>
+              <a:t>11/7/2024</a:t>
             </a:fld>
             <a:endParaRPr lang="en-US"/>
           </a:p>
@@ -25606,6 +25607,293 @@
     <p:extLst>
       <p:ext uri="{BB962C8B-B14F-4D97-AF65-F5344CB8AC3E}">
         <p14:creationId xmlns:p14="http://schemas.microsoft.com/office/powerpoint/2010/main" val="3036771178"/>
+      </p:ext>
+    </p:extLst>
+  </p:cSld>
+  <p:clrMapOvr>
+    <a:masterClrMapping/>
+  </p:clrMapOvr>
+</p:sld>
+</file>
+
+<file path=ppt/slides/slide10.xml><?xml version="1.0" encoding="utf-8"?>
+<p:sld xmlns:a="http://schemas.openxmlformats.org/drawingml/2006/main" xmlns:r="http://schemas.openxmlformats.org/officeDocument/2006/relationships" xmlns:p="http://schemas.openxmlformats.org/presentationml/2006/main">
+  <p:cSld>
+    <p:bg>
+      <p:bgPr>
+        <a:solidFill>
+          <a:schemeClr val="bg2"/>
+        </a:solidFill>
+        <a:effectLst/>
+      </p:bgPr>
+    </p:bg>
+    <p:spTree>
+      <p:nvGrpSpPr>
+        <p:cNvPr id="1" name="">
+          <a:extLst>
+            <a:ext uri="{FF2B5EF4-FFF2-40B4-BE49-F238E27FC236}">
+              <a16:creationId xmlns:a16="http://schemas.microsoft.com/office/drawing/2014/main" id="{AD7CF0F3-9668-DD46-AFB8-75ACDEACD211}"/>
+            </a:ext>
+          </a:extLst>
+        </p:cNvPr>
+        <p:cNvGrpSpPr/>
+        <p:nvPr/>
+      </p:nvGrpSpPr>
+      <p:grpSpPr>
+        <a:xfrm>
+          <a:off x="0" y="0"/>
+          <a:ext cx="0" cy="0"/>
+          <a:chOff x="0" y="0"/>
+          <a:chExt cx="0" cy="0"/>
+        </a:xfrm>
+      </p:grpSpPr>
+      <p:sp>
+        <p:nvSpPr>
+          <p:cNvPr id="12" name="Rectangle 11">
+            <a:extLst>
+              <a:ext uri="{FF2B5EF4-FFF2-40B4-BE49-F238E27FC236}">
+                <a16:creationId xmlns:a16="http://schemas.microsoft.com/office/drawing/2014/main" id="{A93D97C6-63EF-4CA6-B01D-25E2772DC9EF}"/>
+              </a:ext>
+              <a:ext uri="{C183D7F6-B498-43B3-948B-1728B52AA6E4}">
+                <adec:decorative xmlns:adec="http://schemas.microsoft.com/office/drawing/2017/decorative" val="1"/>
+              </a:ext>
+            </a:extLst>
+          </p:cNvPr>
+          <p:cNvSpPr>
+            <a:spLocks noGrp="1" noRot="1" noChangeAspect="1" noMove="1" noResize="1" noEditPoints="1" noAdjustHandles="1" noChangeArrowheads="1" noChangeShapeType="1" noTextEdit="1"/>
+          </p:cNvSpPr>
+          <p:nvPr>
+            <p:extLst>
+              <p:ext uri="{386F3935-93C4-4BCD-93E2-E3B085C9AB24}">
+                <p16:designElem xmlns:p16="http://schemas.microsoft.com/office/powerpoint/2015/main" val="1"/>
+              </p:ext>
+            </p:extLst>
+          </p:nvPr>
+        </p:nvSpPr>
+        <p:spPr>
+          <a:xfrm>
+            <a:off x="0" y="0"/>
+            <a:ext cx="12192000" cy="6858000"/>
+          </a:xfrm>
+          <a:prstGeom prst="rect">
+            <a:avLst/>
+          </a:prstGeom>
+          <a:solidFill>
+            <a:schemeClr val="bg2"/>
+          </a:solidFill>
+          <a:ln>
+            <a:noFill/>
+          </a:ln>
+        </p:spPr>
+        <p:style>
+          <a:lnRef idx="2">
+            <a:schemeClr val="accent1">
+              <a:shade val="50000"/>
+            </a:schemeClr>
+          </a:lnRef>
+          <a:fillRef idx="1">
+            <a:schemeClr val="accent1"/>
+          </a:fillRef>
+          <a:effectRef idx="0">
+            <a:schemeClr val="accent1"/>
+          </a:effectRef>
+          <a:fontRef idx="minor">
+            <a:schemeClr val="lt1"/>
+          </a:fontRef>
+        </p:style>
+        <p:txBody>
+          <a:bodyPr rtlCol="0" anchor="ctr"/>
+          <a:lstStyle/>
+          <a:p>
+            <a:pPr algn="ctr"/>
+            <a:endParaRPr lang="en-US"/>
+          </a:p>
+        </p:txBody>
+      </p:sp>
+      <p:sp>
+        <p:nvSpPr>
+          <p:cNvPr id="2" name="Title 1">
+            <a:extLst>
+              <a:ext uri="{FF2B5EF4-FFF2-40B4-BE49-F238E27FC236}">
+                <a16:creationId xmlns:a16="http://schemas.microsoft.com/office/drawing/2014/main" id="{C487FC23-74CA-98F9-6097-9DBF937034F2}"/>
+              </a:ext>
+            </a:extLst>
+          </p:cNvPr>
+          <p:cNvSpPr>
+            <a:spLocks noGrp="1"/>
+          </p:cNvSpPr>
+          <p:nvPr>
+            <p:ph type="title"/>
+          </p:nvPr>
+        </p:nvSpPr>
+        <p:spPr>
+          <a:xfrm>
+            <a:off x="5100824" y="685800"/>
+            <a:ext cx="6176776" cy="1485900"/>
+          </a:xfrm>
+        </p:spPr>
+        <p:txBody>
+          <a:bodyPr>
+            <a:normAutofit/>
+          </a:bodyPr>
+          <a:lstStyle/>
+          <a:p>
+            <a:r>
+              <a:rPr lang="en-US" sz="3400"/>
+              <a:t>Bonus Exercise: Writing a Basic Terraform Configuration and Running Plan</a:t>
+            </a:r>
+          </a:p>
+        </p:txBody>
+      </p:sp>
+      <p:pic>
+        <p:nvPicPr>
+          <p:cNvPr id="7" name="Graphic 6" descr="Wrench">
+            <a:extLst>
+              <a:ext uri="{FF2B5EF4-FFF2-40B4-BE49-F238E27FC236}">
+                <a16:creationId xmlns:a16="http://schemas.microsoft.com/office/drawing/2014/main" id="{61589604-021D-CEC8-6F14-3F409DC2BD40}"/>
+              </a:ext>
+            </a:extLst>
+          </p:cNvPr>
+          <p:cNvPicPr>
+            <a:picLocks noChangeAspect="1"/>
+          </p:cNvPicPr>
+          <p:nvPr/>
+        </p:nvPicPr>
+        <p:blipFill>
+          <a:blip r:embed="rId2">
+            <a:extLst>
+              <a:ext uri="{28A0092B-C50C-407E-A947-70E740481C1C}">
+                <a14:useLocalDpi xmlns:a14="http://schemas.microsoft.com/office/drawing/2010/main" val="0"/>
+              </a:ext>
+              <a:ext uri="{96DAC541-7B7A-43D3-8B79-37D633B846F1}">
+                <asvg:svgBlip xmlns:asvg="http://schemas.microsoft.com/office/drawing/2016/SVG/main" r:embed="rId3"/>
+              </a:ext>
+            </a:extLst>
+          </a:blip>
+          <a:stretch>
+            <a:fillRect/>
+          </a:stretch>
+        </p:blipFill>
+        <p:spPr>
+          <a:xfrm>
+            <a:off x="634276" y="1881930"/>
+            <a:ext cx="3093388" cy="3093388"/>
+          </a:xfrm>
+          <a:prstGeom prst="rect">
+            <a:avLst/>
+          </a:prstGeom>
+        </p:spPr>
+      </p:pic>
+      <p:sp>
+        <p:nvSpPr>
+          <p:cNvPr id="14" name="Rectangle 13">
+            <a:extLst>
+              <a:ext uri="{FF2B5EF4-FFF2-40B4-BE49-F238E27FC236}">
+                <a16:creationId xmlns:a16="http://schemas.microsoft.com/office/drawing/2014/main" id="{5DA4A40B-EDCE-42FC-B189-AEFB4F82E818}"/>
+              </a:ext>
+              <a:ext uri="{C183D7F6-B498-43B3-948B-1728B52AA6E4}">
+                <adec:decorative xmlns:adec="http://schemas.microsoft.com/office/drawing/2017/decorative" val="1"/>
+              </a:ext>
+            </a:extLst>
+          </p:cNvPr>
+          <p:cNvSpPr>
+            <a:spLocks noGrp="1" noRot="1" noChangeAspect="1" noMove="1" noResize="1" noEditPoints="1" noAdjustHandles="1" noChangeArrowheads="1" noChangeShapeType="1" noTextEdit="1"/>
+          </p:cNvSpPr>
+          <p:nvPr>
+            <p:extLst>
+              <p:ext uri="{386F3935-93C4-4BCD-93E2-E3B085C9AB24}">
+                <p16:designElem xmlns:p16="http://schemas.microsoft.com/office/powerpoint/2015/main" val="1"/>
+              </p:ext>
+            </p:extLst>
+          </p:nvPr>
+        </p:nvSpPr>
+        <p:spPr>
+          <a:xfrm>
+            <a:off x="4373545" y="376"/>
+            <a:ext cx="228600" cy="6858000"/>
+          </a:xfrm>
+          <a:prstGeom prst="rect">
+            <a:avLst/>
+          </a:prstGeom>
+          <a:solidFill>
+            <a:schemeClr val="tx2"/>
+          </a:solidFill>
+          <a:ln>
+            <a:noFill/>
+          </a:ln>
+        </p:spPr>
+        <p:style>
+          <a:lnRef idx="2">
+            <a:schemeClr val="accent1">
+              <a:shade val="50000"/>
+            </a:schemeClr>
+          </a:lnRef>
+          <a:fillRef idx="1">
+            <a:schemeClr val="accent1"/>
+          </a:fillRef>
+          <a:effectRef idx="0">
+            <a:schemeClr val="accent1"/>
+          </a:effectRef>
+          <a:fontRef idx="minor">
+            <a:schemeClr val="lt1"/>
+          </a:fontRef>
+        </p:style>
+        <p:txBody>
+          <a:bodyPr/>
+          <a:lstStyle/>
+          <a:p>
+            <a:endParaRPr lang="en-US"/>
+          </a:p>
+        </p:txBody>
+      </p:sp>
+      <p:sp>
+        <p:nvSpPr>
+          <p:cNvPr id="3" name="Content Placeholder 2">
+            <a:extLst>
+              <a:ext uri="{FF2B5EF4-FFF2-40B4-BE49-F238E27FC236}">
+                <a16:creationId xmlns:a16="http://schemas.microsoft.com/office/drawing/2014/main" id="{BF50C29A-B702-E758-FDE6-D51EDDD489EB}"/>
+              </a:ext>
+            </a:extLst>
+          </p:cNvPr>
+          <p:cNvSpPr>
+            <a:spLocks noGrp="1"/>
+          </p:cNvSpPr>
+          <p:nvPr>
+            <p:ph idx="1"/>
+          </p:nvPr>
+        </p:nvSpPr>
+        <p:spPr>
+          <a:xfrm>
+            <a:off x="5100824" y="2286000"/>
+            <a:ext cx="6176776" cy="3581400"/>
+          </a:xfrm>
+        </p:spPr>
+        <p:txBody>
+          <a:bodyPr>
+            <a:normAutofit/>
+          </a:bodyPr>
+          <a:lstStyle/>
+          <a:p>
+            <a:pPr marL="0" indent="0">
+              <a:buNone/>
+            </a:pPr>
+            <a:r>
+              <a:rPr lang="en-US"/>
+              <a:t>Exercise Objective:</a:t>
+            </a:r>
+          </a:p>
+          <a:p>
+            <a:r>
+              <a:rPr lang="en-US"/>
+              <a:t>Participants will write a basic Terraform configuration that defines an Azure resource (e.g., a Resource Group or Virtual Network) and then run terraform plan to preview the changes Terraform would make.</a:t>
+            </a:r>
+          </a:p>
+        </p:txBody>
+      </p:sp>
+    </p:spTree>
+    <p:extLst>
+      <p:ext uri="{BB962C8B-B14F-4D97-AF65-F5344CB8AC3E}">
+        <p14:creationId xmlns:p14="http://schemas.microsoft.com/office/powerpoint/2010/main" val="2701023975"/>
       </p:ext>
     </p:extLst>
   </p:cSld>
@@ -26513,6 +26801,203 @@
 <file path=ppt/slides/slide8.xml><?xml version="1.0" encoding="utf-8"?>
 <p:sld xmlns:a="http://schemas.openxmlformats.org/drawingml/2006/main" xmlns:r="http://schemas.openxmlformats.org/officeDocument/2006/relationships" xmlns:p="http://schemas.openxmlformats.org/presentationml/2006/main">
   <p:cSld>
+    <p:spTree>
+      <p:nvGrpSpPr>
+        <p:cNvPr id="1" name="">
+          <a:extLst>
+            <a:ext uri="{FF2B5EF4-FFF2-40B4-BE49-F238E27FC236}">
+              <a16:creationId xmlns:a16="http://schemas.microsoft.com/office/drawing/2014/main" id="{6BB319E2-81A2-8DC8-0C4E-F3D78B4441D7}"/>
+            </a:ext>
+          </a:extLst>
+        </p:cNvPr>
+        <p:cNvGrpSpPr/>
+        <p:nvPr/>
+      </p:nvGrpSpPr>
+      <p:grpSpPr>
+        <a:xfrm>
+          <a:off x="0" y="0"/>
+          <a:ext cx="0" cy="0"/>
+          <a:chOff x="0" y="0"/>
+          <a:chExt cx="0" cy="0"/>
+        </a:xfrm>
+      </p:grpSpPr>
+      <p:sp>
+        <p:nvSpPr>
+          <p:cNvPr id="2" name="Title 1">
+            <a:extLst>
+              <a:ext uri="{FF2B5EF4-FFF2-40B4-BE49-F238E27FC236}">
+                <a16:creationId xmlns:a16="http://schemas.microsoft.com/office/drawing/2014/main" id="{43F50855-9D87-0338-DF06-DE148A667EA9}"/>
+              </a:ext>
+            </a:extLst>
+          </p:cNvPr>
+          <p:cNvSpPr>
+            <a:spLocks noGrp="1"/>
+          </p:cNvSpPr>
+          <p:nvPr>
+            <p:ph type="title"/>
+          </p:nvPr>
+        </p:nvSpPr>
+        <p:spPr>
+          <a:xfrm>
+            <a:off x="5100824" y="685800"/>
+            <a:ext cx="6176776" cy="1485900"/>
+          </a:xfrm>
+        </p:spPr>
+        <p:txBody>
+          <a:bodyPr>
+            <a:normAutofit fontScale="90000"/>
+          </a:bodyPr>
+          <a:lstStyle/>
+          <a:p>
+            <a:r>
+              <a:rPr lang="en-US" sz="3700" dirty="0"/>
+              <a:t>Configure Terraform in Azure Cloud Shell with Azure PowerShell</a:t>
+            </a:r>
+          </a:p>
+        </p:txBody>
+      </p:sp>
+      <p:pic>
+        <p:nvPicPr>
+          <p:cNvPr id="7" name="Graphic 6" descr="Wrench">
+            <a:extLst>
+              <a:ext uri="{FF2B5EF4-FFF2-40B4-BE49-F238E27FC236}">
+                <a16:creationId xmlns:a16="http://schemas.microsoft.com/office/drawing/2014/main" id="{3157E068-3AE5-4CD4-A106-0E79E1C65B7C}"/>
+              </a:ext>
+            </a:extLst>
+          </p:cNvPr>
+          <p:cNvPicPr>
+            <a:picLocks noChangeAspect="1"/>
+          </p:cNvPicPr>
+          <p:nvPr/>
+        </p:nvPicPr>
+        <p:blipFill>
+          <a:blip r:embed="rId2">
+            <a:extLst>
+              <a:ext uri="{28A0092B-C50C-407E-A947-70E740481C1C}">
+                <a14:useLocalDpi xmlns:a14="http://schemas.microsoft.com/office/drawing/2010/main" val="0"/>
+              </a:ext>
+              <a:ext uri="{96DAC541-7B7A-43D3-8B79-37D633B846F1}">
+                <asvg:svgBlip xmlns:asvg="http://schemas.microsoft.com/office/drawing/2016/SVG/main" r:embed="rId3"/>
+              </a:ext>
+            </a:extLst>
+          </a:blip>
+          <a:stretch>
+            <a:fillRect/>
+          </a:stretch>
+        </p:blipFill>
+        <p:spPr>
+          <a:xfrm>
+            <a:off x="634276" y="1881930"/>
+            <a:ext cx="3093388" cy="3093388"/>
+          </a:xfrm>
+          <a:prstGeom prst="rect">
+            <a:avLst/>
+          </a:prstGeom>
+        </p:spPr>
+      </p:pic>
+      <p:sp>
+        <p:nvSpPr>
+          <p:cNvPr id="3" name="Content Placeholder 2">
+            <a:extLst>
+              <a:ext uri="{FF2B5EF4-FFF2-40B4-BE49-F238E27FC236}">
+                <a16:creationId xmlns:a16="http://schemas.microsoft.com/office/drawing/2014/main" id="{D84DF131-F121-B519-F334-3A757CE555CD}"/>
+              </a:ext>
+            </a:extLst>
+          </p:cNvPr>
+          <p:cNvSpPr>
+            <a:spLocks noGrp="1"/>
+          </p:cNvSpPr>
+          <p:nvPr>
+            <p:ph idx="1"/>
+          </p:nvPr>
+        </p:nvSpPr>
+        <p:spPr>
+          <a:xfrm>
+            <a:off x="5100824" y="2286000"/>
+            <a:ext cx="6176776" cy="3581400"/>
+          </a:xfrm>
+        </p:spPr>
+        <p:txBody>
+          <a:bodyPr>
+            <a:normAutofit/>
+          </a:bodyPr>
+          <a:lstStyle/>
+          <a:p>
+            <a:r>
+              <a:rPr lang="en-US" sz="1400" b="1" dirty="0"/>
+              <a:t>Objective</a:t>
+            </a:r>
+            <a:r>
+              <a:rPr lang="en-US" sz="1400" dirty="0"/>
+              <a:t>: Confirm that Terraform is set up on Azure subscription.</a:t>
+            </a:r>
+          </a:p>
+          <a:p>
+            <a:r>
+              <a:rPr lang="en-US" sz="1400" b="1" dirty="0"/>
+              <a:t>Steps</a:t>
+            </a:r>
+            <a:r>
+              <a:rPr lang="en-US" sz="1400" dirty="0"/>
+              <a:t>:</a:t>
+            </a:r>
+          </a:p>
+          <a:p>
+            <a:pPr lvl="1"/>
+            <a:r>
+              <a:rPr lang="en-US" sz="1400" dirty="0"/>
+              <a:t>Configure your environment</a:t>
+            </a:r>
+          </a:p>
+          <a:p>
+            <a:pPr lvl="1"/>
+            <a:r>
+              <a:rPr lang="en-US" sz="1400" dirty="0"/>
+              <a:t>Open Cloud Shell</a:t>
+            </a:r>
+          </a:p>
+          <a:p>
+            <a:pPr lvl="1"/>
+            <a:r>
+              <a:rPr lang="en-US" sz="1400" dirty="0"/>
+              <a:t>Get Version of Terraform</a:t>
+            </a:r>
+          </a:p>
+          <a:p>
+            <a:pPr lvl="1"/>
+            <a:r>
+              <a:rPr lang="en-US" sz="1400" dirty="0"/>
+              <a:t>Verify the default Azure subscription</a:t>
+            </a:r>
+          </a:p>
+          <a:p>
+            <a:r>
+              <a:rPr lang="en-US" sz="1400" b="1" dirty="0"/>
+              <a:t>Verification</a:t>
+            </a:r>
+            <a:r>
+              <a:rPr lang="en-US" sz="1400" dirty="0"/>
+              <a:t>: Ensure that the default Azure subscription has Terraform configured correctly.</a:t>
+            </a:r>
+          </a:p>
+        </p:txBody>
+      </p:sp>
+    </p:spTree>
+    <p:extLst>
+      <p:ext uri="{BB962C8B-B14F-4D97-AF65-F5344CB8AC3E}">
+        <p14:creationId xmlns:p14="http://schemas.microsoft.com/office/powerpoint/2010/main" val="2877939100"/>
+      </p:ext>
+    </p:extLst>
+  </p:cSld>
+  <p:clrMapOvr>
+    <a:masterClrMapping/>
+  </p:clrMapOvr>
+</p:sld>
+</file>
+
+<file path=ppt/slides/slide9.xml><?xml version="1.0" encoding="utf-8"?>
+<p:sld xmlns:a="http://schemas.openxmlformats.org/drawingml/2006/main" xmlns:r="http://schemas.openxmlformats.org/officeDocument/2006/relationships" xmlns:p="http://schemas.openxmlformats.org/presentationml/2006/main">
+  <p:cSld>
     <p:bg>
       <p:bgPr>
         <a:solidFill>
@@ -26838,293 +27323,6 @@
     <p:extLst>
       <p:ext uri="{BB962C8B-B14F-4D97-AF65-F5344CB8AC3E}">
         <p14:creationId xmlns:p14="http://schemas.microsoft.com/office/powerpoint/2010/main" val="3589051225"/>
-      </p:ext>
-    </p:extLst>
-  </p:cSld>
-  <p:clrMapOvr>
-    <a:masterClrMapping/>
-  </p:clrMapOvr>
-</p:sld>
-</file>
-
-<file path=ppt/slides/slide9.xml><?xml version="1.0" encoding="utf-8"?>
-<p:sld xmlns:a="http://schemas.openxmlformats.org/drawingml/2006/main" xmlns:r="http://schemas.openxmlformats.org/officeDocument/2006/relationships" xmlns:p="http://schemas.openxmlformats.org/presentationml/2006/main">
-  <p:cSld>
-    <p:bg>
-      <p:bgPr>
-        <a:solidFill>
-          <a:schemeClr val="bg2"/>
-        </a:solidFill>
-        <a:effectLst/>
-      </p:bgPr>
-    </p:bg>
-    <p:spTree>
-      <p:nvGrpSpPr>
-        <p:cNvPr id="1" name="">
-          <a:extLst>
-            <a:ext uri="{FF2B5EF4-FFF2-40B4-BE49-F238E27FC236}">
-              <a16:creationId xmlns:a16="http://schemas.microsoft.com/office/drawing/2014/main" id="{AD7CF0F3-9668-DD46-AFB8-75ACDEACD211}"/>
-            </a:ext>
-          </a:extLst>
-        </p:cNvPr>
-        <p:cNvGrpSpPr/>
-        <p:nvPr/>
-      </p:nvGrpSpPr>
-      <p:grpSpPr>
-        <a:xfrm>
-          <a:off x="0" y="0"/>
-          <a:ext cx="0" cy="0"/>
-          <a:chOff x="0" y="0"/>
-          <a:chExt cx="0" cy="0"/>
-        </a:xfrm>
-      </p:grpSpPr>
-      <p:sp>
-        <p:nvSpPr>
-          <p:cNvPr id="12" name="Rectangle 11">
-            <a:extLst>
-              <a:ext uri="{FF2B5EF4-FFF2-40B4-BE49-F238E27FC236}">
-                <a16:creationId xmlns:a16="http://schemas.microsoft.com/office/drawing/2014/main" id="{A93D97C6-63EF-4CA6-B01D-25E2772DC9EF}"/>
-              </a:ext>
-              <a:ext uri="{C183D7F6-B498-43B3-948B-1728B52AA6E4}">
-                <adec:decorative xmlns:adec="http://schemas.microsoft.com/office/drawing/2017/decorative" val="1"/>
-              </a:ext>
-            </a:extLst>
-          </p:cNvPr>
-          <p:cNvSpPr>
-            <a:spLocks noGrp="1" noRot="1" noChangeAspect="1" noMove="1" noResize="1" noEditPoints="1" noAdjustHandles="1" noChangeArrowheads="1" noChangeShapeType="1" noTextEdit="1"/>
-          </p:cNvSpPr>
-          <p:nvPr>
-            <p:extLst>
-              <p:ext uri="{386F3935-93C4-4BCD-93E2-E3B085C9AB24}">
-                <p16:designElem xmlns:p16="http://schemas.microsoft.com/office/powerpoint/2015/main" val="1"/>
-              </p:ext>
-            </p:extLst>
-          </p:nvPr>
-        </p:nvSpPr>
-        <p:spPr>
-          <a:xfrm>
-            <a:off x="0" y="0"/>
-            <a:ext cx="12192000" cy="6858000"/>
-          </a:xfrm>
-          <a:prstGeom prst="rect">
-            <a:avLst/>
-          </a:prstGeom>
-          <a:solidFill>
-            <a:schemeClr val="bg2"/>
-          </a:solidFill>
-          <a:ln>
-            <a:noFill/>
-          </a:ln>
-        </p:spPr>
-        <p:style>
-          <a:lnRef idx="2">
-            <a:schemeClr val="accent1">
-              <a:shade val="50000"/>
-            </a:schemeClr>
-          </a:lnRef>
-          <a:fillRef idx="1">
-            <a:schemeClr val="accent1"/>
-          </a:fillRef>
-          <a:effectRef idx="0">
-            <a:schemeClr val="accent1"/>
-          </a:effectRef>
-          <a:fontRef idx="minor">
-            <a:schemeClr val="lt1"/>
-          </a:fontRef>
-        </p:style>
-        <p:txBody>
-          <a:bodyPr rtlCol="0" anchor="ctr"/>
-          <a:lstStyle/>
-          <a:p>
-            <a:pPr algn="ctr"/>
-            <a:endParaRPr lang="en-US"/>
-          </a:p>
-        </p:txBody>
-      </p:sp>
-      <p:sp>
-        <p:nvSpPr>
-          <p:cNvPr id="2" name="Title 1">
-            <a:extLst>
-              <a:ext uri="{FF2B5EF4-FFF2-40B4-BE49-F238E27FC236}">
-                <a16:creationId xmlns:a16="http://schemas.microsoft.com/office/drawing/2014/main" id="{C487FC23-74CA-98F9-6097-9DBF937034F2}"/>
-              </a:ext>
-            </a:extLst>
-          </p:cNvPr>
-          <p:cNvSpPr>
-            <a:spLocks noGrp="1"/>
-          </p:cNvSpPr>
-          <p:nvPr>
-            <p:ph type="title"/>
-          </p:nvPr>
-        </p:nvSpPr>
-        <p:spPr>
-          <a:xfrm>
-            <a:off x="5100824" y="685800"/>
-            <a:ext cx="6176776" cy="1485900"/>
-          </a:xfrm>
-        </p:spPr>
-        <p:txBody>
-          <a:bodyPr>
-            <a:normAutofit/>
-          </a:bodyPr>
-          <a:lstStyle/>
-          <a:p>
-            <a:r>
-              <a:rPr lang="en-US" sz="3400"/>
-              <a:t>Bonus Exercise: Writing a Basic Terraform Configuration and Running Plan</a:t>
-            </a:r>
-          </a:p>
-        </p:txBody>
-      </p:sp>
-      <p:pic>
-        <p:nvPicPr>
-          <p:cNvPr id="7" name="Graphic 6" descr="Wrench">
-            <a:extLst>
-              <a:ext uri="{FF2B5EF4-FFF2-40B4-BE49-F238E27FC236}">
-                <a16:creationId xmlns:a16="http://schemas.microsoft.com/office/drawing/2014/main" id="{61589604-021D-CEC8-6F14-3F409DC2BD40}"/>
-              </a:ext>
-            </a:extLst>
-          </p:cNvPr>
-          <p:cNvPicPr>
-            <a:picLocks noChangeAspect="1"/>
-          </p:cNvPicPr>
-          <p:nvPr/>
-        </p:nvPicPr>
-        <p:blipFill>
-          <a:blip r:embed="rId2">
-            <a:extLst>
-              <a:ext uri="{28A0092B-C50C-407E-A947-70E740481C1C}">
-                <a14:useLocalDpi xmlns:a14="http://schemas.microsoft.com/office/drawing/2010/main" val="0"/>
-              </a:ext>
-              <a:ext uri="{96DAC541-7B7A-43D3-8B79-37D633B846F1}">
-                <asvg:svgBlip xmlns:asvg="http://schemas.microsoft.com/office/drawing/2016/SVG/main" r:embed="rId3"/>
-              </a:ext>
-            </a:extLst>
-          </a:blip>
-          <a:stretch>
-            <a:fillRect/>
-          </a:stretch>
-        </p:blipFill>
-        <p:spPr>
-          <a:xfrm>
-            <a:off x="634276" y="1881930"/>
-            <a:ext cx="3093388" cy="3093388"/>
-          </a:xfrm>
-          <a:prstGeom prst="rect">
-            <a:avLst/>
-          </a:prstGeom>
-        </p:spPr>
-      </p:pic>
-      <p:sp>
-        <p:nvSpPr>
-          <p:cNvPr id="14" name="Rectangle 13">
-            <a:extLst>
-              <a:ext uri="{FF2B5EF4-FFF2-40B4-BE49-F238E27FC236}">
-                <a16:creationId xmlns:a16="http://schemas.microsoft.com/office/drawing/2014/main" id="{5DA4A40B-EDCE-42FC-B189-AEFB4F82E818}"/>
-              </a:ext>
-              <a:ext uri="{C183D7F6-B498-43B3-948B-1728B52AA6E4}">
-                <adec:decorative xmlns:adec="http://schemas.microsoft.com/office/drawing/2017/decorative" val="1"/>
-              </a:ext>
-            </a:extLst>
-          </p:cNvPr>
-          <p:cNvSpPr>
-            <a:spLocks noGrp="1" noRot="1" noChangeAspect="1" noMove="1" noResize="1" noEditPoints="1" noAdjustHandles="1" noChangeArrowheads="1" noChangeShapeType="1" noTextEdit="1"/>
-          </p:cNvSpPr>
-          <p:nvPr>
-            <p:extLst>
-              <p:ext uri="{386F3935-93C4-4BCD-93E2-E3B085C9AB24}">
-                <p16:designElem xmlns:p16="http://schemas.microsoft.com/office/powerpoint/2015/main" val="1"/>
-              </p:ext>
-            </p:extLst>
-          </p:nvPr>
-        </p:nvSpPr>
-        <p:spPr>
-          <a:xfrm>
-            <a:off x="4373545" y="376"/>
-            <a:ext cx="228600" cy="6858000"/>
-          </a:xfrm>
-          <a:prstGeom prst="rect">
-            <a:avLst/>
-          </a:prstGeom>
-          <a:solidFill>
-            <a:schemeClr val="tx2"/>
-          </a:solidFill>
-          <a:ln>
-            <a:noFill/>
-          </a:ln>
-        </p:spPr>
-        <p:style>
-          <a:lnRef idx="2">
-            <a:schemeClr val="accent1">
-              <a:shade val="50000"/>
-            </a:schemeClr>
-          </a:lnRef>
-          <a:fillRef idx="1">
-            <a:schemeClr val="accent1"/>
-          </a:fillRef>
-          <a:effectRef idx="0">
-            <a:schemeClr val="accent1"/>
-          </a:effectRef>
-          <a:fontRef idx="minor">
-            <a:schemeClr val="lt1"/>
-          </a:fontRef>
-        </p:style>
-        <p:txBody>
-          <a:bodyPr/>
-          <a:lstStyle/>
-          <a:p>
-            <a:endParaRPr lang="en-US"/>
-          </a:p>
-        </p:txBody>
-      </p:sp>
-      <p:sp>
-        <p:nvSpPr>
-          <p:cNvPr id="3" name="Content Placeholder 2">
-            <a:extLst>
-              <a:ext uri="{FF2B5EF4-FFF2-40B4-BE49-F238E27FC236}">
-                <a16:creationId xmlns:a16="http://schemas.microsoft.com/office/drawing/2014/main" id="{BF50C29A-B702-E758-FDE6-D51EDDD489EB}"/>
-              </a:ext>
-            </a:extLst>
-          </p:cNvPr>
-          <p:cNvSpPr>
-            <a:spLocks noGrp="1"/>
-          </p:cNvSpPr>
-          <p:nvPr>
-            <p:ph idx="1"/>
-          </p:nvPr>
-        </p:nvSpPr>
-        <p:spPr>
-          <a:xfrm>
-            <a:off x="5100824" y="2286000"/>
-            <a:ext cx="6176776" cy="3581400"/>
-          </a:xfrm>
-        </p:spPr>
-        <p:txBody>
-          <a:bodyPr>
-            <a:normAutofit/>
-          </a:bodyPr>
-          <a:lstStyle/>
-          <a:p>
-            <a:pPr marL="0" indent="0">
-              <a:buNone/>
-            </a:pPr>
-            <a:r>
-              <a:rPr lang="en-US"/>
-              <a:t>Exercise Objective:</a:t>
-            </a:r>
-          </a:p>
-          <a:p>
-            <a:r>
-              <a:rPr lang="en-US"/>
-              <a:t>Participants will write a basic Terraform configuration that defines an Azure resource (e.g., a Resource Group or Virtual Network) and then run terraform plan to preview the changes Terraform would make.</a:t>
-            </a:r>
-          </a:p>
-        </p:txBody>
-      </p:sp>
-    </p:spTree>
-    <p:extLst>
-      <p:ext uri="{BB962C8B-B14F-4D97-AF65-F5344CB8AC3E}">
-        <p14:creationId xmlns:p14="http://schemas.microsoft.com/office/powerpoint/2010/main" val="2701023975"/>
       </p:ext>
     </p:extLst>
   </p:cSld>

</xml_diff>